<commit_message>
Update metadata propagation images
</commit_message>
<xml_diff>
--- a/docs/proposals/images/in-place-propagation/Metadata propagation.pptx
+++ b/docs/proposals/images/in-place-propagation/Metadata propagation.pptx
@@ -836,7 +836,7 @@
         </p:nvSpPr>
         <p:spPr>
           <a:xfrm>
-            <a:off x="295" y="685800"/>
+            <a:off x="0" y="685800"/>
             <a:ext cx="6858000" cy="3429000"/>
           </a:xfrm>
           <a:custGeom>
@@ -940,7 +940,7 @@
         </p:nvSpPr>
         <p:spPr>
           <a:xfrm>
-            <a:off x="295" y="685800"/>
+            <a:off x="0" y="685800"/>
             <a:ext cx="6858000" cy="3429000"/>
           </a:xfrm>
           <a:custGeom>
@@ -21761,29 +21761,29 @@
               <a:buNone/>
             </a:pPr>
             <a:r>
-              <a:rPr lang="en">
+              <a:rPr lang="en" dirty="0">
                 <a:solidFill>
                   <a:srgbClr val="FF0000"/>
                 </a:solidFill>
               </a:rPr>
-              <a:t>*only labels, </a:t>
+              <a:t>*labels and annotation</a:t>
             </a:r>
             <a:br>
-              <a:rPr lang="en">
+              <a:rPr lang="en" dirty="0">
                 <a:solidFill>
                   <a:srgbClr val="FF0000"/>
                 </a:solidFill>
               </a:rPr>
             </a:br>
             <a:r>
-              <a:rPr lang="en">
+              <a:rPr lang="en" dirty="0">
                 <a:solidFill>
                   <a:srgbClr val="FF0000"/>
                 </a:solidFill>
               </a:rPr>
               <a:t>filtered by prefix/domain</a:t>
             </a:r>
-            <a:endParaRPr>
+            <a:endParaRPr dirty="0">
               <a:solidFill>
                 <a:srgbClr val="FF0000"/>
               </a:solidFill>
@@ -30552,29 +30552,29 @@
               <a:buNone/>
             </a:pPr>
             <a:r>
-              <a:rPr lang="en">
+              <a:rPr lang="en" dirty="0">
                 <a:solidFill>
                   <a:srgbClr val="FF0000"/>
                 </a:solidFill>
               </a:rPr>
-              <a:t>*only labels, </a:t>
+              <a:t>* labels and annotation</a:t>
             </a:r>
             <a:br>
-              <a:rPr lang="en">
+              <a:rPr lang="en" dirty="0">
                 <a:solidFill>
                   <a:srgbClr val="FF0000"/>
                 </a:solidFill>
               </a:rPr>
             </a:br>
             <a:r>
-              <a:rPr lang="en">
+              <a:rPr lang="en" dirty="0">
                 <a:solidFill>
                   <a:srgbClr val="FF0000"/>
                 </a:solidFill>
               </a:rPr>
               <a:t>filtered by prefix/domain</a:t>
             </a:r>
-            <a:endParaRPr>
+            <a:endParaRPr dirty="0">
               <a:solidFill>
                 <a:srgbClr val="FF0000"/>
               </a:solidFill>
@@ -31163,8 +31163,8 @@
         </p:nvSpPr>
         <p:spPr>
           <a:xfrm>
-            <a:off x="11236200" y="12327850"/>
-            <a:ext cx="2118300" cy="400200"/>
+            <a:off x="11236199" y="12327850"/>
+            <a:ext cx="2201173" cy="400200"/>
           </a:xfrm>
           <a:prstGeom prst="rect">
             <a:avLst/>
@@ -31190,14 +31190,14 @@
               <a:buNone/>
             </a:pPr>
             <a:r>
-              <a:rPr lang="en">
+              <a:rPr lang="en" dirty="0">
                 <a:solidFill>
                   <a:srgbClr val="FF0000"/>
                 </a:solidFill>
               </a:rPr>
               <a:t>Cluster ∪ CC ∪ template</a:t>
             </a:r>
-            <a:endParaRPr>
+            <a:endParaRPr dirty="0">
               <a:solidFill>
                 <a:schemeClr val="dk1"/>
               </a:solidFill>
@@ -31213,8 +31213,8 @@
         </p:nvSpPr>
         <p:spPr>
           <a:xfrm>
-            <a:off x="11236200" y="13423200"/>
-            <a:ext cx="2118300" cy="400200"/>
+            <a:off x="11236199" y="13423200"/>
+            <a:ext cx="2201173" cy="400200"/>
           </a:xfrm>
           <a:prstGeom prst="rect">
             <a:avLst/>
@@ -31263,8 +31263,8 @@
         </p:nvSpPr>
         <p:spPr>
           <a:xfrm>
-            <a:off x="11236200" y="14402550"/>
-            <a:ext cx="2118300" cy="400200"/>
+            <a:off x="11236199" y="14402550"/>
+            <a:ext cx="2201173" cy="400200"/>
           </a:xfrm>
           <a:prstGeom prst="rect">
             <a:avLst/>
@@ -31313,8 +31313,8 @@
         </p:nvSpPr>
         <p:spPr>
           <a:xfrm>
-            <a:off x="11236200" y="15497900"/>
-            <a:ext cx="2118300" cy="400200"/>
+            <a:off x="11236199" y="15497900"/>
+            <a:ext cx="2201173" cy="400200"/>
           </a:xfrm>
           <a:prstGeom prst="rect">
             <a:avLst/>
@@ -31550,7 +31550,7 @@
           </a:ln>
         </p:spPr>
         <p:txBody>
-          <a:bodyPr spcFirstLastPara="1" wrap="square" lIns="91425" tIns="91425" rIns="91425" bIns="91425" anchor="ctr" anchorCtr="0">
+          <a:bodyPr spcFirstLastPara="1" wrap="square" lIns="36000" tIns="91425" rIns="36000" bIns="91425" anchor="ctr" anchorCtr="0">
             <a:noAutofit/>
           </a:bodyPr>
           <a:lstStyle/>
@@ -31568,14 +31568,14 @@
               <a:buNone/>
             </a:pPr>
             <a:r>
-              <a:rPr lang="en" sz="2800" b="1">
+              <a:rPr lang="en" sz="2800" b="1" dirty="0">
                 <a:solidFill>
                   <a:schemeClr val="lt1"/>
                 </a:solidFill>
               </a:rPr>
               <a:t>4b</a:t>
             </a:r>
-            <a:endParaRPr sz="2800" b="1">
+            <a:endParaRPr sz="2800" b="1" dirty="0">
               <a:solidFill>
                 <a:schemeClr val="lt1"/>
               </a:solidFill>

</xml_diff>